<commit_message>
Update Figures [Enregistrement automatique].pptx
</commit_message>
<xml_diff>
--- a/Figures [Enregistrement automatique].pptx
+++ b/Figures [Enregistrement automatique].pptx
@@ -263,7 +263,7 @@
           <a:p>
             <a:fld id="{8650A246-1026-46AD-AFCC-0ACF25FECB60}" type="datetimeFigureOut">
               <a:rPr lang="fr-FR" smtClean="0"/>
-              <a:t>15/05/2023</a:t>
+              <a:t>23/10/2023</a:t>
             </a:fld>
             <a:endParaRPr lang="fr-FR"/>
           </a:p>
@@ -551,7 +551,7 @@
           <a:p>
             <a:fld id="{8650A246-1026-46AD-AFCC-0ACF25FECB60}" type="datetimeFigureOut">
               <a:rPr lang="fr-FR" smtClean="0"/>
-              <a:t>15/05/2023</a:t>
+              <a:t>23/10/2023</a:t>
             </a:fld>
             <a:endParaRPr lang="fr-FR"/>
           </a:p>
@@ -749,7 +749,7 @@
           <a:p>
             <a:fld id="{8650A246-1026-46AD-AFCC-0ACF25FECB60}" type="datetimeFigureOut">
               <a:rPr lang="fr-FR" smtClean="0"/>
-              <a:t>15/05/2023</a:t>
+              <a:t>23/10/2023</a:t>
             </a:fld>
             <a:endParaRPr lang="fr-FR"/>
           </a:p>
@@ -957,7 +957,7 @@
           <a:p>
             <a:fld id="{8650A246-1026-46AD-AFCC-0ACF25FECB60}" type="datetimeFigureOut">
               <a:rPr lang="fr-FR" smtClean="0"/>
-              <a:t>15/05/2023</a:t>
+              <a:t>23/10/2023</a:t>
             </a:fld>
             <a:endParaRPr lang="fr-FR"/>
           </a:p>
@@ -1155,7 +1155,7 @@
           <a:p>
             <a:fld id="{8650A246-1026-46AD-AFCC-0ACF25FECB60}" type="datetimeFigureOut">
               <a:rPr lang="fr-FR" smtClean="0"/>
-              <a:t>15/05/2023</a:t>
+              <a:t>23/10/2023</a:t>
             </a:fld>
             <a:endParaRPr lang="fr-FR"/>
           </a:p>
@@ -1430,7 +1430,7 @@
           <a:p>
             <a:fld id="{8650A246-1026-46AD-AFCC-0ACF25FECB60}" type="datetimeFigureOut">
               <a:rPr lang="fr-FR" smtClean="0"/>
-              <a:t>15/05/2023</a:t>
+              <a:t>23/10/2023</a:t>
             </a:fld>
             <a:endParaRPr lang="fr-FR"/>
           </a:p>
@@ -1695,7 +1695,7 @@
           <a:p>
             <a:fld id="{8650A246-1026-46AD-AFCC-0ACF25FECB60}" type="datetimeFigureOut">
               <a:rPr lang="fr-FR" smtClean="0"/>
-              <a:t>15/05/2023</a:t>
+              <a:t>23/10/2023</a:t>
             </a:fld>
             <a:endParaRPr lang="fr-FR"/>
           </a:p>
@@ -2107,7 +2107,7 @@
           <a:p>
             <a:fld id="{8650A246-1026-46AD-AFCC-0ACF25FECB60}" type="datetimeFigureOut">
               <a:rPr lang="fr-FR" smtClean="0"/>
-              <a:t>15/05/2023</a:t>
+              <a:t>23/10/2023</a:t>
             </a:fld>
             <a:endParaRPr lang="fr-FR"/>
           </a:p>
@@ -2248,7 +2248,7 @@
           <a:p>
             <a:fld id="{8650A246-1026-46AD-AFCC-0ACF25FECB60}" type="datetimeFigureOut">
               <a:rPr lang="fr-FR" smtClean="0"/>
-              <a:t>15/05/2023</a:t>
+              <a:t>23/10/2023</a:t>
             </a:fld>
             <a:endParaRPr lang="fr-FR"/>
           </a:p>
@@ -2462,7 +2462,7 @@
           <a:p>
             <a:fld id="{8650A246-1026-46AD-AFCC-0ACF25FECB60}" type="datetimeFigureOut">
               <a:rPr lang="fr-FR" smtClean="0"/>
-              <a:t>15/05/2023</a:t>
+              <a:t>23/10/2023</a:t>
             </a:fld>
             <a:endParaRPr lang="fr-FR"/>
           </a:p>
@@ -2575,7 +2575,7 @@
           <a:p>
             <a:fld id="{8650A246-1026-46AD-AFCC-0ACF25FECB60}" type="datetimeFigureOut">
               <a:rPr lang="fr-FR" smtClean="0"/>
-              <a:t>15/05/2023</a:t>
+              <a:t>23/10/2023</a:t>
             </a:fld>
             <a:endParaRPr lang="fr-FR"/>
           </a:p>
@@ -2886,7 +2886,7 @@
           <a:p>
             <a:fld id="{8650A246-1026-46AD-AFCC-0ACF25FECB60}" type="datetimeFigureOut">
               <a:rPr lang="fr-FR" smtClean="0"/>
-              <a:t>15/05/2023</a:t>
+              <a:t>23/10/2023</a:t>
             </a:fld>
             <a:endParaRPr lang="fr-FR"/>
           </a:p>
@@ -3127,7 +3127,7 @@
           <a:p>
             <a:fld id="{8650A246-1026-46AD-AFCC-0ACF25FECB60}" type="datetimeFigureOut">
               <a:rPr lang="fr-FR" smtClean="0"/>
-              <a:t>15/05/2023</a:t>
+              <a:t>23/10/2023</a:t>
             </a:fld>
             <a:endParaRPr lang="fr-FR"/>
           </a:p>
@@ -9407,6 +9407,954 @@
           <a:chExt cx="0" cy="0"/>
         </a:xfrm>
       </p:grpSpPr>
+      <p:cxnSp>
+        <p:nvCxnSpPr>
+          <p:cNvPr id="3" name="Connecteur droit avec flèche 2">
+            <a:extLst>
+              <a:ext uri="{FF2B5EF4-FFF2-40B4-BE49-F238E27FC236}">
+                <a16:creationId xmlns:a16="http://schemas.microsoft.com/office/drawing/2014/main" id="{18CA7C2B-DFAA-3B5B-DD49-EF287D62D77F}"/>
+              </a:ext>
+            </a:extLst>
+          </p:cNvPr>
+          <p:cNvCxnSpPr>
+            <a:cxnSpLocks/>
+          </p:cNvCxnSpPr>
+          <p:nvPr/>
+        </p:nvCxnSpPr>
+        <p:spPr>
+          <a:xfrm flipV="1">
+            <a:off x="1046480" y="1989000"/>
+            <a:ext cx="0" cy="1440000"/>
+          </a:xfrm>
+          <a:prstGeom prst="straightConnector1">
+            <a:avLst/>
+          </a:prstGeom>
+          <a:ln>
+            <a:solidFill>
+              <a:srgbClr val="002060"/>
+            </a:solidFill>
+            <a:tailEnd type="stealth" w="med" len="lg"/>
+          </a:ln>
+        </p:spPr>
+        <p:style>
+          <a:lnRef idx="1">
+            <a:schemeClr val="accent1"/>
+          </a:lnRef>
+          <a:fillRef idx="0">
+            <a:schemeClr val="accent1"/>
+          </a:fillRef>
+          <a:effectRef idx="0">
+            <a:schemeClr val="accent1"/>
+          </a:effectRef>
+          <a:fontRef idx="minor">
+            <a:schemeClr val="tx1"/>
+          </a:fontRef>
+        </p:style>
+      </p:cxnSp>
+      <p:sp>
+        <p:nvSpPr>
+          <p:cNvPr id="7" name="Trapèze 6">
+            <a:extLst>
+              <a:ext uri="{FF2B5EF4-FFF2-40B4-BE49-F238E27FC236}">
+                <a16:creationId xmlns:a16="http://schemas.microsoft.com/office/drawing/2014/main" id="{94A7DBB9-8B87-9DC4-24F3-1CDB08A2F6F4}"/>
+              </a:ext>
+            </a:extLst>
+          </p:cNvPr>
+          <p:cNvSpPr/>
+          <p:nvPr/>
+        </p:nvSpPr>
+        <p:spPr>
+          <a:xfrm>
+            <a:off x="1046478" y="2455332"/>
+            <a:ext cx="1968863" cy="973667"/>
+          </a:xfrm>
+          <a:prstGeom prst="trapezoid">
+            <a:avLst>
+              <a:gd name="adj" fmla="val 26044"/>
+            </a:avLst>
+          </a:prstGeom>
+          <a:solidFill>
+            <a:schemeClr val="accent2">
+              <a:lumMod val="20000"/>
+              <a:lumOff val="80000"/>
+            </a:schemeClr>
+          </a:solidFill>
+          <a:ln>
+            <a:solidFill>
+              <a:schemeClr val="accent2">
+                <a:lumMod val="50000"/>
+              </a:schemeClr>
+            </a:solidFill>
+          </a:ln>
+        </p:spPr>
+        <p:style>
+          <a:lnRef idx="2">
+            <a:schemeClr val="accent1">
+              <a:shade val="15000"/>
+            </a:schemeClr>
+          </a:lnRef>
+          <a:fillRef idx="1">
+            <a:schemeClr val="accent1"/>
+          </a:fillRef>
+          <a:effectRef idx="0">
+            <a:schemeClr val="accent1"/>
+          </a:effectRef>
+          <a:fontRef idx="minor">
+            <a:schemeClr val="lt1"/>
+          </a:fontRef>
+        </p:style>
+        <p:txBody>
+          <a:bodyPr rtlCol="0" anchor="ctr"/>
+          <a:lstStyle/>
+          <a:p>
+            <a:pPr algn="ctr"/>
+            <a:endParaRPr lang="fr-FR" dirty="0"/>
+          </a:p>
+        </p:txBody>
+      </p:sp>
+      <p:cxnSp>
+        <p:nvCxnSpPr>
+          <p:cNvPr id="5" name="Connecteur droit avec flèche 4">
+            <a:extLst>
+              <a:ext uri="{FF2B5EF4-FFF2-40B4-BE49-F238E27FC236}">
+                <a16:creationId xmlns:a16="http://schemas.microsoft.com/office/drawing/2014/main" id="{10FB8054-D472-375B-E9B6-9C21F23DBCF2}"/>
+              </a:ext>
+            </a:extLst>
+          </p:cNvPr>
+          <p:cNvCxnSpPr>
+            <a:cxnSpLocks/>
+          </p:cNvCxnSpPr>
+          <p:nvPr/>
+        </p:nvCxnSpPr>
+        <p:spPr>
+          <a:xfrm>
+            <a:off x="1046480" y="3429000"/>
+            <a:ext cx="2175691" cy="0"/>
+          </a:xfrm>
+          <a:prstGeom prst="straightConnector1">
+            <a:avLst/>
+          </a:prstGeom>
+          <a:ln>
+            <a:solidFill>
+              <a:srgbClr val="002060"/>
+            </a:solidFill>
+            <a:tailEnd type="stealth" w="med" len="lg"/>
+          </a:ln>
+        </p:spPr>
+        <p:style>
+          <a:lnRef idx="1">
+            <a:schemeClr val="accent1"/>
+          </a:lnRef>
+          <a:fillRef idx="0">
+            <a:schemeClr val="accent1"/>
+          </a:fillRef>
+          <a:effectRef idx="0">
+            <a:schemeClr val="accent1"/>
+          </a:effectRef>
+          <a:fontRef idx="minor">
+            <a:schemeClr val="tx1"/>
+          </a:fontRef>
+        </p:style>
+      </p:cxnSp>
+      <p:cxnSp>
+        <p:nvCxnSpPr>
+          <p:cNvPr id="8" name="Connecteur droit avec flèche 7">
+            <a:extLst>
+              <a:ext uri="{FF2B5EF4-FFF2-40B4-BE49-F238E27FC236}">
+                <a16:creationId xmlns:a16="http://schemas.microsoft.com/office/drawing/2014/main" id="{52283DFF-C665-FE06-394D-8900BD8D333D}"/>
+              </a:ext>
+            </a:extLst>
+          </p:cNvPr>
+          <p:cNvCxnSpPr>
+            <a:cxnSpLocks/>
+          </p:cNvCxnSpPr>
+          <p:nvPr/>
+        </p:nvCxnSpPr>
+        <p:spPr>
+          <a:xfrm flipV="1">
+            <a:off x="1300480" y="2455332"/>
+            <a:ext cx="0" cy="973668"/>
+          </a:xfrm>
+          <a:prstGeom prst="straightConnector1">
+            <a:avLst/>
+          </a:prstGeom>
+          <a:ln>
+            <a:solidFill>
+              <a:srgbClr val="002060"/>
+            </a:solidFill>
+            <a:prstDash val="dash"/>
+            <a:tailEnd type="none" w="med" len="lg"/>
+          </a:ln>
+        </p:spPr>
+        <p:style>
+          <a:lnRef idx="1">
+            <a:schemeClr val="accent1"/>
+          </a:lnRef>
+          <a:fillRef idx="0">
+            <a:schemeClr val="accent1"/>
+          </a:fillRef>
+          <a:effectRef idx="0">
+            <a:schemeClr val="accent1"/>
+          </a:effectRef>
+          <a:fontRef idx="minor">
+            <a:schemeClr val="tx1"/>
+          </a:fontRef>
+        </p:style>
+      </p:cxnSp>
+      <p:cxnSp>
+        <p:nvCxnSpPr>
+          <p:cNvPr id="10" name="Connecteur droit avec flèche 9">
+            <a:extLst>
+              <a:ext uri="{FF2B5EF4-FFF2-40B4-BE49-F238E27FC236}">
+                <a16:creationId xmlns:a16="http://schemas.microsoft.com/office/drawing/2014/main" id="{0D8FE66D-B1B8-8C6E-A5A0-3B376CC20652}"/>
+              </a:ext>
+            </a:extLst>
+          </p:cNvPr>
+          <p:cNvCxnSpPr>
+            <a:cxnSpLocks/>
+          </p:cNvCxnSpPr>
+          <p:nvPr/>
+        </p:nvCxnSpPr>
+        <p:spPr>
+          <a:xfrm flipV="1">
+            <a:off x="2758440" y="2455331"/>
+            <a:ext cx="0" cy="973668"/>
+          </a:xfrm>
+          <a:prstGeom prst="straightConnector1">
+            <a:avLst/>
+          </a:prstGeom>
+          <a:ln>
+            <a:solidFill>
+              <a:srgbClr val="002060"/>
+            </a:solidFill>
+            <a:prstDash val="dash"/>
+            <a:tailEnd type="none" w="med" len="lg"/>
+          </a:ln>
+        </p:spPr>
+        <p:style>
+          <a:lnRef idx="1">
+            <a:schemeClr val="accent1"/>
+          </a:lnRef>
+          <a:fillRef idx="0">
+            <a:schemeClr val="accent1"/>
+          </a:fillRef>
+          <a:effectRef idx="0">
+            <a:schemeClr val="accent1"/>
+          </a:effectRef>
+          <a:fontRef idx="minor">
+            <a:schemeClr val="tx1"/>
+          </a:fontRef>
+        </p:style>
+      </p:cxnSp>
+      <mc:AlternateContent xmlns:mc="http://schemas.openxmlformats.org/markup-compatibility/2006">
+        <mc:Choice xmlns:a14="http://schemas.microsoft.com/office/drawing/2010/main" Requires="a14">
+          <p:sp>
+            <p:nvSpPr>
+              <p:cNvPr id="11" name="ZoneTexte 10">
+                <a:extLst>
+                  <a:ext uri="{FF2B5EF4-FFF2-40B4-BE49-F238E27FC236}">
+                    <a16:creationId xmlns:a16="http://schemas.microsoft.com/office/drawing/2014/main" id="{4C9C68B8-7E8E-3324-A750-638C726B6CC8}"/>
+                  </a:ext>
+                </a:extLst>
+              </p:cNvPr>
+              <p:cNvSpPr txBox="1"/>
+              <p:nvPr/>
+            </p:nvSpPr>
+            <p:spPr>
+              <a:xfrm>
+                <a:off x="3067384" y="3152000"/>
+                <a:ext cx="149913" cy="276999"/>
+              </a:xfrm>
+              <a:prstGeom prst="rect">
+                <a:avLst/>
+              </a:prstGeom>
+              <a:noFill/>
+            </p:spPr>
+            <p:txBody>
+              <a:bodyPr wrap="none" lIns="0" tIns="0" rIns="0" bIns="0" rtlCol="0">
+                <a:spAutoFit/>
+              </a:bodyPr>
+              <a:lstStyle/>
+              <a:p>
+                <a14:m>
+                  <m:oMathPara xmlns:m="http://schemas.openxmlformats.org/officeDocument/2006/math">
+                    <m:oMathParaPr>
+                      <m:jc m:val="centerGroup"/>
+                    </m:oMathParaPr>
+                    <m:oMath xmlns:m="http://schemas.openxmlformats.org/officeDocument/2006/math">
+                      <m:r>
+                        <a:rPr lang="fr-FR" b="0" i="1" smtClean="0">
+                          <a:latin typeface="Cambria Math" panose="02040503050406030204" pitchFamily="18" charset="0"/>
+                        </a:rPr>
+                        <m:t>𝑡</m:t>
+                      </m:r>
+                    </m:oMath>
+                  </m:oMathPara>
+                </a14:m>
+                <a:endParaRPr lang="fr-FR" dirty="0"/>
+              </a:p>
+            </p:txBody>
+          </p:sp>
+        </mc:Choice>
+        <mc:Fallback>
+          <p:sp>
+            <p:nvSpPr>
+              <p:cNvPr id="11" name="ZoneTexte 10">
+                <a:extLst>
+                  <a:ext uri="{FF2B5EF4-FFF2-40B4-BE49-F238E27FC236}">
+                    <a16:creationId xmlns:a16="http://schemas.microsoft.com/office/drawing/2014/main" id="{4C9C68B8-7E8E-3324-A750-638C726B6CC8}"/>
+                  </a:ext>
+                </a:extLst>
+              </p:cNvPr>
+              <p:cNvSpPr txBox="1">
+                <a:spLocks noRot="1" noChangeAspect="1" noMove="1" noResize="1" noEditPoints="1" noAdjustHandles="1" noChangeArrowheads="1" noChangeShapeType="1" noTextEdit="1"/>
+              </p:cNvSpPr>
+              <p:nvPr/>
+            </p:nvSpPr>
+            <p:spPr>
+              <a:xfrm>
+                <a:off x="3067384" y="3152000"/>
+                <a:ext cx="149913" cy="276999"/>
+              </a:xfrm>
+              <a:prstGeom prst="rect">
+                <a:avLst/>
+              </a:prstGeom>
+              <a:blipFill>
+                <a:blip r:embed="rId2"/>
+                <a:stretch>
+                  <a:fillRect l="-32000" r="-28000" b="-6667"/>
+                </a:stretch>
+              </a:blipFill>
+            </p:spPr>
+            <p:txBody>
+              <a:bodyPr/>
+              <a:lstStyle/>
+              <a:p>
+                <a:r>
+                  <a:rPr lang="fr-FR">
+                    <a:noFill/>
+                  </a:rPr>
+                  <a:t> </a:t>
+                </a:r>
+              </a:p>
+            </p:txBody>
+          </p:sp>
+        </mc:Fallback>
+      </mc:AlternateContent>
+      <mc:AlternateContent xmlns:mc="http://schemas.openxmlformats.org/markup-compatibility/2006">
+        <mc:Choice xmlns:a14="http://schemas.microsoft.com/office/drawing/2010/main" Requires="a14">
+          <p:sp>
+            <p:nvSpPr>
+              <p:cNvPr id="12" name="ZoneTexte 11">
+                <a:extLst>
+                  <a:ext uri="{FF2B5EF4-FFF2-40B4-BE49-F238E27FC236}">
+                    <a16:creationId xmlns:a16="http://schemas.microsoft.com/office/drawing/2014/main" id="{056307E9-BEB6-56E0-261F-21F31E6411CD}"/>
+                  </a:ext>
+                </a:extLst>
+              </p:cNvPr>
+              <p:cNvSpPr txBox="1"/>
+              <p:nvPr/>
+            </p:nvSpPr>
+            <p:spPr>
+              <a:xfrm>
+                <a:off x="626565" y="1989000"/>
+                <a:ext cx="365485" cy="215444"/>
+              </a:xfrm>
+              <a:prstGeom prst="rect">
+                <a:avLst/>
+              </a:prstGeom>
+              <a:noFill/>
+            </p:spPr>
+            <p:txBody>
+              <a:bodyPr wrap="none" lIns="0" tIns="0" rIns="0" bIns="0" rtlCol="0">
+                <a:spAutoFit/>
+              </a:bodyPr>
+              <a:lstStyle/>
+              <a:p>
+                <a14:m>
+                  <m:oMathPara xmlns:m="http://schemas.openxmlformats.org/officeDocument/2006/math">
+                    <m:oMathParaPr>
+                      <m:jc m:val="centerGroup"/>
+                    </m:oMathParaPr>
+                    <m:oMath xmlns:m="http://schemas.openxmlformats.org/officeDocument/2006/math">
+                      <m:r>
+                        <a:rPr lang="fr-FR" sz="1400" b="0" i="1" smtClean="0">
+                          <a:latin typeface="Cambria Math" panose="02040503050406030204" pitchFamily="18" charset="0"/>
+                        </a:rPr>
+                        <m:t>𝑣</m:t>
+                      </m:r>
+                      <m:r>
+                        <a:rPr lang="fr-FR" sz="1400" b="0" i="1" smtClean="0">
+                          <a:latin typeface="Cambria Math" panose="02040503050406030204" pitchFamily="18" charset="0"/>
+                        </a:rPr>
+                        <m:t>(</m:t>
+                      </m:r>
+                      <m:r>
+                        <a:rPr lang="fr-FR" sz="1400" b="0" i="1" smtClean="0">
+                          <a:latin typeface="Cambria Math" panose="02040503050406030204" pitchFamily="18" charset="0"/>
+                        </a:rPr>
+                        <m:t>𝑡</m:t>
+                      </m:r>
+                      <m:r>
+                        <a:rPr lang="fr-FR" sz="1400" b="0" i="1" smtClean="0">
+                          <a:latin typeface="Cambria Math" panose="02040503050406030204" pitchFamily="18" charset="0"/>
+                        </a:rPr>
+                        <m:t>)</m:t>
+                      </m:r>
+                    </m:oMath>
+                  </m:oMathPara>
+                </a14:m>
+                <a:endParaRPr lang="fr-FR" sz="1400" dirty="0"/>
+              </a:p>
+            </p:txBody>
+          </p:sp>
+        </mc:Choice>
+        <mc:Fallback>
+          <p:sp>
+            <p:nvSpPr>
+              <p:cNvPr id="12" name="ZoneTexte 11">
+                <a:extLst>
+                  <a:ext uri="{FF2B5EF4-FFF2-40B4-BE49-F238E27FC236}">
+                    <a16:creationId xmlns:a16="http://schemas.microsoft.com/office/drawing/2014/main" id="{056307E9-BEB6-56E0-261F-21F31E6411CD}"/>
+                  </a:ext>
+                </a:extLst>
+              </p:cNvPr>
+              <p:cNvSpPr txBox="1">
+                <a:spLocks noRot="1" noChangeAspect="1" noMove="1" noResize="1" noEditPoints="1" noAdjustHandles="1" noChangeArrowheads="1" noChangeShapeType="1" noTextEdit="1"/>
+              </p:cNvSpPr>
+              <p:nvPr/>
+            </p:nvSpPr>
+            <p:spPr>
+              <a:xfrm>
+                <a:off x="626565" y="1989000"/>
+                <a:ext cx="365485" cy="215444"/>
+              </a:xfrm>
+              <a:prstGeom prst="rect">
+                <a:avLst/>
+              </a:prstGeom>
+              <a:blipFill>
+                <a:blip r:embed="rId3"/>
+                <a:stretch>
+                  <a:fillRect l="-6667" r="-15000" b="-30556"/>
+                </a:stretch>
+              </a:blipFill>
+            </p:spPr>
+            <p:txBody>
+              <a:bodyPr/>
+              <a:lstStyle/>
+              <a:p>
+                <a:r>
+                  <a:rPr lang="fr-FR">
+                    <a:noFill/>
+                  </a:rPr>
+                  <a:t> </a:t>
+                </a:r>
+              </a:p>
+            </p:txBody>
+          </p:sp>
+        </mc:Fallback>
+      </mc:AlternateContent>
+      <p:cxnSp>
+        <p:nvCxnSpPr>
+          <p:cNvPr id="13" name="Connecteur droit avec flèche 12">
+            <a:extLst>
+              <a:ext uri="{FF2B5EF4-FFF2-40B4-BE49-F238E27FC236}">
+                <a16:creationId xmlns:a16="http://schemas.microsoft.com/office/drawing/2014/main" id="{A9BC7F03-45A9-256C-FE9A-4A6FF81CE7B7}"/>
+              </a:ext>
+            </a:extLst>
+          </p:cNvPr>
+          <p:cNvCxnSpPr>
+            <a:cxnSpLocks/>
+          </p:cNvCxnSpPr>
+          <p:nvPr/>
+        </p:nvCxnSpPr>
+        <p:spPr>
+          <a:xfrm>
+            <a:off x="1041604" y="2455331"/>
+            <a:ext cx="258876" cy="0"/>
+          </a:xfrm>
+          <a:prstGeom prst="straightConnector1">
+            <a:avLst/>
+          </a:prstGeom>
+          <a:ln>
+            <a:solidFill>
+              <a:srgbClr val="002060"/>
+            </a:solidFill>
+            <a:prstDash val="dash"/>
+            <a:tailEnd type="none" w="med" len="lg"/>
+          </a:ln>
+        </p:spPr>
+        <p:style>
+          <a:lnRef idx="1">
+            <a:schemeClr val="accent1"/>
+          </a:lnRef>
+          <a:fillRef idx="0">
+            <a:schemeClr val="accent1"/>
+          </a:fillRef>
+          <a:effectRef idx="0">
+            <a:schemeClr val="accent1"/>
+          </a:effectRef>
+          <a:fontRef idx="minor">
+            <a:schemeClr val="tx1"/>
+          </a:fontRef>
+        </p:style>
+      </p:cxnSp>
+      <mc:AlternateContent xmlns:mc="http://schemas.openxmlformats.org/markup-compatibility/2006">
+        <mc:Choice xmlns:a14="http://schemas.microsoft.com/office/drawing/2010/main" Requires="a14">
+          <p:sp>
+            <p:nvSpPr>
+              <p:cNvPr id="16" name="ZoneTexte 15">
+                <a:extLst>
+                  <a:ext uri="{FF2B5EF4-FFF2-40B4-BE49-F238E27FC236}">
+                    <a16:creationId xmlns:a16="http://schemas.microsoft.com/office/drawing/2014/main" id="{9457E4AA-CA22-80A7-9E3A-17E4FAD67473}"/>
+                  </a:ext>
+                </a:extLst>
+              </p:cNvPr>
+              <p:cNvSpPr txBox="1"/>
+              <p:nvPr/>
+            </p:nvSpPr>
+            <p:spPr>
+              <a:xfrm>
+                <a:off x="567562" y="2353420"/>
+                <a:ext cx="418833" cy="215444"/>
+              </a:xfrm>
+              <a:prstGeom prst="rect">
+                <a:avLst/>
+              </a:prstGeom>
+              <a:noFill/>
+            </p:spPr>
+            <p:txBody>
+              <a:bodyPr wrap="none" lIns="0" tIns="0" rIns="0" bIns="0" rtlCol="0">
+                <a:spAutoFit/>
+              </a:bodyPr>
+              <a:lstStyle/>
+              <a:p>
+                <a14:m>
+                  <m:oMathPara xmlns:m="http://schemas.openxmlformats.org/officeDocument/2006/math">
+                    <m:oMathParaPr>
+                      <m:jc m:val="centerGroup"/>
+                    </m:oMathParaPr>
+                    <m:oMath xmlns:m="http://schemas.openxmlformats.org/officeDocument/2006/math">
+                      <m:sSub>
+                        <m:sSubPr>
+                          <m:ctrlPr>
+                            <a:rPr lang="fr-FR" sz="1400" b="0" i="1" smtClean="0">
+                              <a:latin typeface="Cambria Math" panose="02040503050406030204" pitchFamily="18" charset="0"/>
+                            </a:rPr>
+                          </m:ctrlPr>
+                        </m:sSubPr>
+                        <m:e>
+                          <m:r>
+                            <a:rPr lang="fr-FR" sz="1400" b="0" i="1" smtClean="0">
+                              <a:latin typeface="Cambria Math" panose="02040503050406030204" pitchFamily="18" charset="0"/>
+                            </a:rPr>
+                            <m:t>𝑣</m:t>
+                          </m:r>
+                        </m:e>
+                        <m:sub>
+                          <m:r>
+                            <a:rPr lang="fr-FR" sz="1400" b="0" i="1" smtClean="0">
+                              <a:latin typeface="Cambria Math" panose="02040503050406030204" pitchFamily="18" charset="0"/>
+                            </a:rPr>
+                            <m:t>𝑚𝑎𝑥</m:t>
+                          </m:r>
+                        </m:sub>
+                      </m:sSub>
+                    </m:oMath>
+                  </m:oMathPara>
+                </a14:m>
+                <a:endParaRPr lang="fr-FR" sz="1400" dirty="0"/>
+              </a:p>
+            </p:txBody>
+          </p:sp>
+        </mc:Choice>
+        <mc:Fallback>
+          <p:sp>
+            <p:nvSpPr>
+              <p:cNvPr id="16" name="ZoneTexte 15">
+                <a:extLst>
+                  <a:ext uri="{FF2B5EF4-FFF2-40B4-BE49-F238E27FC236}">
+                    <a16:creationId xmlns:a16="http://schemas.microsoft.com/office/drawing/2014/main" id="{9457E4AA-CA22-80A7-9E3A-17E4FAD67473}"/>
+                  </a:ext>
+                </a:extLst>
+              </p:cNvPr>
+              <p:cNvSpPr txBox="1">
+                <a:spLocks noRot="1" noChangeAspect="1" noMove="1" noResize="1" noEditPoints="1" noAdjustHandles="1" noChangeArrowheads="1" noChangeShapeType="1" noTextEdit="1"/>
+              </p:cNvSpPr>
+              <p:nvPr/>
+            </p:nvSpPr>
+            <p:spPr>
+              <a:xfrm>
+                <a:off x="567562" y="2353420"/>
+                <a:ext cx="418833" cy="215444"/>
+              </a:xfrm>
+              <a:prstGeom prst="rect">
+                <a:avLst/>
+              </a:prstGeom>
+              <a:blipFill>
+                <a:blip r:embed="rId4"/>
+                <a:stretch>
+                  <a:fillRect l="-5797" b="-11429"/>
+                </a:stretch>
+              </a:blipFill>
+            </p:spPr>
+            <p:txBody>
+              <a:bodyPr/>
+              <a:lstStyle/>
+              <a:p>
+                <a:r>
+                  <a:rPr lang="fr-FR">
+                    <a:noFill/>
+                  </a:rPr>
+                  <a:t> </a:t>
+                </a:r>
+              </a:p>
+            </p:txBody>
+          </p:sp>
+        </mc:Fallback>
+      </mc:AlternateContent>
+      <mc:AlternateContent xmlns:mc="http://schemas.openxmlformats.org/markup-compatibility/2006">
+        <mc:Choice xmlns:a14="http://schemas.microsoft.com/office/drawing/2010/main" Requires="a14">
+          <p:sp>
+            <p:nvSpPr>
+              <p:cNvPr id="17" name="ZoneTexte 16">
+                <a:extLst>
+                  <a:ext uri="{FF2B5EF4-FFF2-40B4-BE49-F238E27FC236}">
+                    <a16:creationId xmlns:a16="http://schemas.microsoft.com/office/drawing/2014/main" id="{0B431CCC-9673-E322-E412-4D3F6DBFD1F0}"/>
+                  </a:ext>
+                </a:extLst>
+              </p:cNvPr>
+              <p:cNvSpPr txBox="1"/>
+              <p:nvPr/>
+            </p:nvSpPr>
+            <p:spPr>
+              <a:xfrm>
+                <a:off x="1207185" y="3486260"/>
+                <a:ext cx="186590" cy="215444"/>
+              </a:xfrm>
+              <a:prstGeom prst="rect">
+                <a:avLst/>
+              </a:prstGeom>
+              <a:noFill/>
+            </p:spPr>
+            <p:txBody>
+              <a:bodyPr wrap="none" lIns="0" tIns="0" rIns="0" bIns="0" rtlCol="0">
+                <a:spAutoFit/>
+              </a:bodyPr>
+              <a:lstStyle/>
+              <a:p>
+                <a14:m>
+                  <m:oMathPara xmlns:m="http://schemas.openxmlformats.org/officeDocument/2006/math">
+                    <m:oMathParaPr>
+                      <m:jc m:val="centerGroup"/>
+                    </m:oMathParaPr>
+                    <m:oMath xmlns:m="http://schemas.openxmlformats.org/officeDocument/2006/math">
+                      <m:sSub>
+                        <m:sSubPr>
+                          <m:ctrlPr>
+                            <a:rPr lang="fr-FR" sz="1400" b="0" i="1" smtClean="0">
+                              <a:latin typeface="Cambria Math" panose="02040503050406030204" pitchFamily="18" charset="0"/>
+                            </a:rPr>
+                          </m:ctrlPr>
+                        </m:sSubPr>
+                        <m:e>
+                          <m:r>
+                            <a:rPr lang="fr-FR" sz="1400" b="0" i="1" smtClean="0">
+                              <a:latin typeface="Cambria Math" panose="02040503050406030204" pitchFamily="18" charset="0"/>
+                            </a:rPr>
+                            <m:t>𝑡</m:t>
+                          </m:r>
+                        </m:e>
+                        <m:sub>
+                          <m:r>
+                            <a:rPr lang="fr-FR" sz="1400" b="0" i="1" smtClean="0">
+                              <a:latin typeface="Cambria Math" panose="02040503050406030204" pitchFamily="18" charset="0"/>
+                            </a:rPr>
+                            <m:t>1</m:t>
+                          </m:r>
+                        </m:sub>
+                      </m:sSub>
+                    </m:oMath>
+                  </m:oMathPara>
+                </a14:m>
+                <a:endParaRPr lang="fr-FR" sz="1400" dirty="0"/>
+              </a:p>
+            </p:txBody>
+          </p:sp>
+        </mc:Choice>
+        <mc:Fallback>
+          <p:sp>
+            <p:nvSpPr>
+              <p:cNvPr id="17" name="ZoneTexte 16">
+                <a:extLst>
+                  <a:ext uri="{FF2B5EF4-FFF2-40B4-BE49-F238E27FC236}">
+                    <a16:creationId xmlns:a16="http://schemas.microsoft.com/office/drawing/2014/main" id="{0B431CCC-9673-E322-E412-4D3F6DBFD1F0}"/>
+                  </a:ext>
+                </a:extLst>
+              </p:cNvPr>
+              <p:cNvSpPr txBox="1">
+                <a:spLocks noRot="1" noChangeAspect="1" noMove="1" noResize="1" noEditPoints="1" noAdjustHandles="1" noChangeArrowheads="1" noChangeShapeType="1" noTextEdit="1"/>
+              </p:cNvSpPr>
+              <p:nvPr/>
+            </p:nvSpPr>
+            <p:spPr>
+              <a:xfrm>
+                <a:off x="1207185" y="3486260"/>
+                <a:ext cx="186590" cy="215444"/>
+              </a:xfrm>
+              <a:prstGeom prst="rect">
+                <a:avLst/>
+              </a:prstGeom>
+              <a:blipFill>
+                <a:blip r:embed="rId5"/>
+                <a:stretch>
+                  <a:fillRect l="-19355" r="-3226" b="-14286"/>
+                </a:stretch>
+              </a:blipFill>
+            </p:spPr>
+            <p:txBody>
+              <a:bodyPr/>
+              <a:lstStyle/>
+              <a:p>
+                <a:r>
+                  <a:rPr lang="fr-FR">
+                    <a:noFill/>
+                  </a:rPr>
+                  <a:t> </a:t>
+                </a:r>
+              </a:p>
+            </p:txBody>
+          </p:sp>
+        </mc:Fallback>
+      </mc:AlternateContent>
+      <mc:AlternateContent xmlns:mc="http://schemas.openxmlformats.org/markup-compatibility/2006">
+        <mc:Choice xmlns:a14="http://schemas.microsoft.com/office/drawing/2010/main" Requires="a14">
+          <p:sp>
+            <p:nvSpPr>
+              <p:cNvPr id="18" name="ZoneTexte 17">
+                <a:extLst>
+                  <a:ext uri="{FF2B5EF4-FFF2-40B4-BE49-F238E27FC236}">
+                    <a16:creationId xmlns:a16="http://schemas.microsoft.com/office/drawing/2014/main" id="{F1459487-8D7E-E495-D536-4DF88129027F}"/>
+                  </a:ext>
+                </a:extLst>
+              </p:cNvPr>
+              <p:cNvSpPr txBox="1"/>
+              <p:nvPr/>
+            </p:nvSpPr>
+            <p:spPr>
+              <a:xfrm>
+                <a:off x="2665145" y="3486260"/>
+                <a:ext cx="190758" cy="215444"/>
+              </a:xfrm>
+              <a:prstGeom prst="rect">
+                <a:avLst/>
+              </a:prstGeom>
+              <a:noFill/>
+            </p:spPr>
+            <p:txBody>
+              <a:bodyPr wrap="none" lIns="0" tIns="0" rIns="0" bIns="0" rtlCol="0">
+                <a:spAutoFit/>
+              </a:bodyPr>
+              <a:lstStyle/>
+              <a:p>
+                <a14:m>
+                  <m:oMathPara xmlns:m="http://schemas.openxmlformats.org/officeDocument/2006/math">
+                    <m:oMathParaPr>
+                      <m:jc m:val="centerGroup"/>
+                    </m:oMathParaPr>
+                    <m:oMath xmlns:m="http://schemas.openxmlformats.org/officeDocument/2006/math">
+                      <m:sSub>
+                        <m:sSubPr>
+                          <m:ctrlPr>
+                            <a:rPr lang="fr-FR" sz="1400" b="0" i="1" smtClean="0">
+                              <a:latin typeface="Cambria Math" panose="02040503050406030204" pitchFamily="18" charset="0"/>
+                            </a:rPr>
+                          </m:ctrlPr>
+                        </m:sSubPr>
+                        <m:e>
+                          <m:r>
+                            <a:rPr lang="fr-FR" sz="1400" b="0" i="1" smtClean="0">
+                              <a:latin typeface="Cambria Math" panose="02040503050406030204" pitchFamily="18" charset="0"/>
+                            </a:rPr>
+                            <m:t>𝑡</m:t>
+                          </m:r>
+                        </m:e>
+                        <m:sub>
+                          <m:r>
+                            <a:rPr lang="fr-FR" sz="1400" b="0" i="1" smtClean="0">
+                              <a:latin typeface="Cambria Math" panose="02040503050406030204" pitchFamily="18" charset="0"/>
+                            </a:rPr>
+                            <m:t>2</m:t>
+                          </m:r>
+                        </m:sub>
+                      </m:sSub>
+                    </m:oMath>
+                  </m:oMathPara>
+                </a14:m>
+                <a:endParaRPr lang="fr-FR" sz="1400" dirty="0"/>
+              </a:p>
+            </p:txBody>
+          </p:sp>
+        </mc:Choice>
+        <mc:Fallback>
+          <p:sp>
+            <p:nvSpPr>
+              <p:cNvPr id="18" name="ZoneTexte 17">
+                <a:extLst>
+                  <a:ext uri="{FF2B5EF4-FFF2-40B4-BE49-F238E27FC236}">
+                    <a16:creationId xmlns:a16="http://schemas.microsoft.com/office/drawing/2014/main" id="{F1459487-8D7E-E495-D536-4DF88129027F}"/>
+                  </a:ext>
+                </a:extLst>
+              </p:cNvPr>
+              <p:cNvSpPr txBox="1">
+                <a:spLocks noRot="1" noChangeAspect="1" noMove="1" noResize="1" noEditPoints="1" noAdjustHandles="1" noChangeArrowheads="1" noChangeShapeType="1" noTextEdit="1"/>
+              </p:cNvSpPr>
+              <p:nvPr/>
+            </p:nvSpPr>
+            <p:spPr>
+              <a:xfrm>
+                <a:off x="2665145" y="3486260"/>
+                <a:ext cx="190758" cy="215444"/>
+              </a:xfrm>
+              <a:prstGeom prst="rect">
+                <a:avLst/>
+              </a:prstGeom>
+              <a:blipFill>
+                <a:blip r:embed="rId6"/>
+                <a:stretch>
+                  <a:fillRect l="-19355" r="-6452" b="-14286"/>
+                </a:stretch>
+              </a:blipFill>
+            </p:spPr>
+            <p:txBody>
+              <a:bodyPr/>
+              <a:lstStyle/>
+              <a:p>
+                <a:r>
+                  <a:rPr lang="fr-FR">
+                    <a:noFill/>
+                  </a:rPr>
+                  <a:t> </a:t>
+                </a:r>
+              </a:p>
+            </p:txBody>
+          </p:sp>
+        </mc:Fallback>
+      </mc:AlternateContent>
+      <mc:AlternateContent xmlns:mc="http://schemas.openxmlformats.org/markup-compatibility/2006">
+        <mc:Choice xmlns:a14="http://schemas.microsoft.com/office/drawing/2010/main" Requires="a14">
+          <p:sp>
+            <p:nvSpPr>
+              <p:cNvPr id="19" name="ZoneTexte 18">
+                <a:extLst>
+                  <a:ext uri="{FF2B5EF4-FFF2-40B4-BE49-F238E27FC236}">
+                    <a16:creationId xmlns:a16="http://schemas.microsoft.com/office/drawing/2014/main" id="{0BBFA339-6634-C541-ABBD-E3D27FAC7C25}"/>
+                  </a:ext>
+                </a:extLst>
+              </p:cNvPr>
+              <p:cNvSpPr txBox="1"/>
+              <p:nvPr/>
+            </p:nvSpPr>
+            <p:spPr>
+              <a:xfrm>
+                <a:off x="2951582" y="3486260"/>
+                <a:ext cx="190758" cy="215444"/>
+              </a:xfrm>
+              <a:prstGeom prst="rect">
+                <a:avLst/>
+              </a:prstGeom>
+              <a:noFill/>
+            </p:spPr>
+            <p:txBody>
+              <a:bodyPr wrap="none" lIns="0" tIns="0" rIns="0" bIns="0" rtlCol="0">
+                <a:spAutoFit/>
+              </a:bodyPr>
+              <a:lstStyle/>
+              <a:p>
+                <a14:m>
+                  <m:oMathPara xmlns:m="http://schemas.openxmlformats.org/officeDocument/2006/math">
+                    <m:oMathParaPr>
+                      <m:jc m:val="centerGroup"/>
+                    </m:oMathParaPr>
+                    <m:oMath xmlns:m="http://schemas.openxmlformats.org/officeDocument/2006/math">
+                      <m:sSub>
+                        <m:sSubPr>
+                          <m:ctrlPr>
+                            <a:rPr lang="fr-FR" sz="1400" b="0" i="1" smtClean="0">
+                              <a:latin typeface="Cambria Math" panose="02040503050406030204" pitchFamily="18" charset="0"/>
+                            </a:rPr>
+                          </m:ctrlPr>
+                        </m:sSubPr>
+                        <m:e>
+                          <m:r>
+                            <a:rPr lang="fr-FR" sz="1400" b="0" i="1" smtClean="0">
+                              <a:latin typeface="Cambria Math" panose="02040503050406030204" pitchFamily="18" charset="0"/>
+                            </a:rPr>
+                            <m:t>𝑡</m:t>
+                          </m:r>
+                        </m:e>
+                        <m:sub>
+                          <m:r>
+                            <a:rPr lang="fr-FR" sz="1400" b="0" i="1" smtClean="0">
+                              <a:latin typeface="Cambria Math" panose="02040503050406030204" pitchFamily="18" charset="0"/>
+                            </a:rPr>
+                            <m:t>3</m:t>
+                          </m:r>
+                        </m:sub>
+                      </m:sSub>
+                    </m:oMath>
+                  </m:oMathPara>
+                </a14:m>
+                <a:endParaRPr lang="fr-FR" sz="1400" dirty="0"/>
+              </a:p>
+            </p:txBody>
+          </p:sp>
+        </mc:Choice>
+        <mc:Fallback>
+          <p:sp>
+            <p:nvSpPr>
+              <p:cNvPr id="19" name="ZoneTexte 18">
+                <a:extLst>
+                  <a:ext uri="{FF2B5EF4-FFF2-40B4-BE49-F238E27FC236}">
+                    <a16:creationId xmlns:a16="http://schemas.microsoft.com/office/drawing/2014/main" id="{0BBFA339-6634-C541-ABBD-E3D27FAC7C25}"/>
+                  </a:ext>
+                </a:extLst>
+              </p:cNvPr>
+              <p:cNvSpPr txBox="1">
+                <a:spLocks noRot="1" noChangeAspect="1" noMove="1" noResize="1" noEditPoints="1" noAdjustHandles="1" noChangeArrowheads="1" noChangeShapeType="1" noTextEdit="1"/>
+              </p:cNvSpPr>
+              <p:nvPr/>
+            </p:nvSpPr>
+            <p:spPr>
+              <a:xfrm>
+                <a:off x="2951582" y="3486260"/>
+                <a:ext cx="190758" cy="215444"/>
+              </a:xfrm>
+              <a:prstGeom prst="rect">
+                <a:avLst/>
+              </a:prstGeom>
+              <a:blipFill>
+                <a:blip r:embed="rId7"/>
+                <a:stretch>
+                  <a:fillRect l="-19355" r="-6452" b="-14286"/>
+                </a:stretch>
+              </a:blipFill>
+            </p:spPr>
+            <p:txBody>
+              <a:bodyPr/>
+              <a:lstStyle/>
+              <a:p>
+                <a:r>
+                  <a:rPr lang="fr-FR">
+                    <a:noFill/>
+                  </a:rPr>
+                  <a:t> </a:t>
+                </a:r>
+              </a:p>
+            </p:txBody>
+          </p:sp>
+        </mc:Fallback>
+      </mc:AlternateContent>
     </p:spTree>
     <p:extLst>
       <p:ext uri="{BB962C8B-B14F-4D97-AF65-F5344CB8AC3E}">

</xml_diff>